<commit_message>
bug fix, add check coupon exist
</commit_message>
<xml_diff>
--- a/presentation.pptx
+++ b/presentation.pptx
@@ -4393,12 +4393,12 @@
 </file>
 
 <file path=customXml/item1.xml><?xml version="1.0" encoding="utf-8"?>
-<p:properties xmlns:p="http://schemas.microsoft.com/office/2006/metadata/properties" xmlns:xsi="http://www.w3.org/2001/XMLSchema-instance" xmlns:pc="http://schemas.microsoft.com/office/infopath/2007/PartnerControls">
-  <documentManagement>
-    <Status xmlns="71af3243-3dd4-4a8d-8c0d-dd76da1f02a5">Not started</Status>
-    <MediaServiceKeyPoints xmlns="71af3243-3dd4-4a8d-8c0d-dd76da1f02a5" xsi:nil="true"/>
-  </documentManagement>
-</p:properties>
+<?mso-contentType ?>
+<FormTemplates xmlns="http://schemas.microsoft.com/sharepoint/v3/contenttype/forms">
+  <Display>DocumentLibraryForm</Display>
+  <Edit>DocumentLibraryForm</Edit>
+  <New>DocumentLibraryForm</New>
+</FormTemplates>
 </file>
 
 <file path=customXml/item2.xml><?xml version="1.0" encoding="utf-8"?>
@@ -4623,20 +4623,18 @@
 </file>
 
 <file path=customXml/item3.xml><?xml version="1.0" encoding="utf-8"?>
-<?mso-contentType ?>
-<FormTemplates xmlns="http://schemas.microsoft.com/sharepoint/v3/contenttype/forms">
-  <Display>DocumentLibraryForm</Display>
-  <Edit>DocumentLibraryForm</Edit>
-  <New>DocumentLibraryForm</New>
-</FormTemplates>
+<p:properties xmlns:p="http://schemas.microsoft.com/office/2006/metadata/properties" xmlns:xsi="http://www.w3.org/2001/XMLSchema-instance" xmlns:pc="http://schemas.microsoft.com/office/infopath/2007/PartnerControls">
+  <documentManagement>
+    <Status xmlns="71af3243-3dd4-4a8d-8c0d-dd76da1f02a5">Not started</Status>
+    <MediaServiceKeyPoints xmlns="71af3243-3dd4-4a8d-8c0d-dd76da1f02a5" xsi:nil="true"/>
+  </documentManagement>
+</p:properties>
 </file>
 
 <file path=customXml/itemProps1.xml><?xml version="1.0" encoding="utf-8"?>
-<ds:datastoreItem xmlns:ds="http://schemas.openxmlformats.org/officeDocument/2006/customXml" ds:itemID="{4F5B1FD9-3BB6-4DA9-A089-3B68C2323D4F}">
+<ds:datastoreItem xmlns:ds="http://schemas.openxmlformats.org/officeDocument/2006/customXml" ds:itemID="{638A3B04-B0F3-4C12-A722-52B5CF6D9723}">
   <ds:schemaRefs>
-    <ds:schemaRef ds:uri="http://schemas.microsoft.com/office/2006/metadata/properties"/>
-    <ds:schemaRef ds:uri="http://schemas.microsoft.com/office/infopath/2007/PartnerControls"/>
-    <ds:schemaRef ds:uri="71af3243-3dd4-4a8d-8c0d-dd76da1f02a5"/>
+    <ds:schemaRef ds:uri="http://schemas.microsoft.com/sharepoint/v3/contenttype/forms"/>
   </ds:schemaRefs>
 </ds:datastoreItem>
 </file>
@@ -4661,9 +4659,11 @@
 </file>
 
 <file path=customXml/itemProps3.xml><?xml version="1.0" encoding="utf-8"?>
-<ds:datastoreItem xmlns:ds="http://schemas.openxmlformats.org/officeDocument/2006/customXml" ds:itemID="{638A3B04-B0F3-4C12-A722-52B5CF6D9723}">
+<ds:datastoreItem xmlns:ds="http://schemas.openxmlformats.org/officeDocument/2006/customXml" ds:itemID="{4F5B1FD9-3BB6-4DA9-A089-3B68C2323D4F}">
   <ds:schemaRefs>
-    <ds:schemaRef ds:uri="http://schemas.microsoft.com/sharepoint/v3/contenttype/forms"/>
+    <ds:schemaRef ds:uri="http://schemas.microsoft.com/office/2006/metadata/properties"/>
+    <ds:schemaRef ds:uri="http://schemas.microsoft.com/office/infopath/2007/PartnerControls"/>
+    <ds:schemaRef ds:uri="71af3243-3dd4-4a8d-8c0d-dd76da1f02a5"/>
   </ds:schemaRefs>
 </ds:datastoreItem>
 </file>
</xml_diff>